<commit_message>
Se agrego sentencia de control for
</commit_message>
<xml_diff>
--- a/PresentancionInterprete.pptx
+++ b/PresentancionInterprete.pptx
@@ -267,7 +267,7 @@
           <a:p>
             <a:fld id="{C21E9A4D-486D-44AE-8B3F-36C139010308}" type="datetimeFigureOut">
               <a:rPr lang="es-GT" smtClean="0"/>
-              <a:t>24/03/2023</a:t>
+              <a:t>7/10/2023</a:t>
             </a:fld>
             <a:endParaRPr lang="es-GT"/>
           </a:p>
@@ -467,7 +467,7 @@
           <a:p>
             <a:fld id="{C21E9A4D-486D-44AE-8B3F-36C139010308}" type="datetimeFigureOut">
               <a:rPr lang="es-GT" smtClean="0"/>
-              <a:t>24/03/2023</a:t>
+              <a:t>7/10/2023</a:t>
             </a:fld>
             <a:endParaRPr lang="es-GT"/>
           </a:p>
@@ -677,7 +677,7 @@
           <a:p>
             <a:fld id="{C21E9A4D-486D-44AE-8B3F-36C139010308}" type="datetimeFigureOut">
               <a:rPr lang="es-GT" smtClean="0"/>
-              <a:t>24/03/2023</a:t>
+              <a:t>7/10/2023</a:t>
             </a:fld>
             <a:endParaRPr lang="es-GT"/>
           </a:p>
@@ -877,7 +877,7 @@
           <a:p>
             <a:fld id="{C21E9A4D-486D-44AE-8B3F-36C139010308}" type="datetimeFigureOut">
               <a:rPr lang="es-GT" smtClean="0"/>
-              <a:t>24/03/2023</a:t>
+              <a:t>7/10/2023</a:t>
             </a:fld>
             <a:endParaRPr lang="es-GT"/>
           </a:p>
@@ -1153,7 +1153,7 @@
           <a:p>
             <a:fld id="{C21E9A4D-486D-44AE-8B3F-36C139010308}" type="datetimeFigureOut">
               <a:rPr lang="es-GT" smtClean="0"/>
-              <a:t>24/03/2023</a:t>
+              <a:t>7/10/2023</a:t>
             </a:fld>
             <a:endParaRPr lang="es-GT"/>
           </a:p>
@@ -1421,7 +1421,7 @@
           <a:p>
             <a:fld id="{C21E9A4D-486D-44AE-8B3F-36C139010308}" type="datetimeFigureOut">
               <a:rPr lang="es-GT" smtClean="0"/>
-              <a:t>24/03/2023</a:t>
+              <a:t>7/10/2023</a:t>
             </a:fld>
             <a:endParaRPr lang="es-GT"/>
           </a:p>
@@ -1836,7 +1836,7 @@
           <a:p>
             <a:fld id="{C21E9A4D-486D-44AE-8B3F-36C139010308}" type="datetimeFigureOut">
               <a:rPr lang="es-GT" smtClean="0"/>
-              <a:t>24/03/2023</a:t>
+              <a:t>7/10/2023</a:t>
             </a:fld>
             <a:endParaRPr lang="es-GT"/>
           </a:p>
@@ -1978,7 +1978,7 @@
           <a:p>
             <a:fld id="{C21E9A4D-486D-44AE-8B3F-36C139010308}" type="datetimeFigureOut">
               <a:rPr lang="es-GT" smtClean="0"/>
-              <a:t>24/03/2023</a:t>
+              <a:t>7/10/2023</a:t>
             </a:fld>
             <a:endParaRPr lang="es-GT"/>
           </a:p>
@@ -2091,7 +2091,7 @@
           <a:p>
             <a:fld id="{C21E9A4D-486D-44AE-8B3F-36C139010308}" type="datetimeFigureOut">
               <a:rPr lang="es-GT" smtClean="0"/>
-              <a:t>24/03/2023</a:t>
+              <a:t>7/10/2023</a:t>
             </a:fld>
             <a:endParaRPr lang="es-GT"/>
           </a:p>
@@ -2404,7 +2404,7 @@
           <a:p>
             <a:fld id="{C21E9A4D-486D-44AE-8B3F-36C139010308}" type="datetimeFigureOut">
               <a:rPr lang="es-GT" smtClean="0"/>
-              <a:t>24/03/2023</a:t>
+              <a:t>7/10/2023</a:t>
             </a:fld>
             <a:endParaRPr lang="es-GT"/>
           </a:p>
@@ -2693,7 +2693,7 @@
           <a:p>
             <a:fld id="{C21E9A4D-486D-44AE-8B3F-36C139010308}" type="datetimeFigureOut">
               <a:rPr lang="es-GT" smtClean="0"/>
-              <a:t>24/03/2023</a:t>
+              <a:t>7/10/2023</a:t>
             </a:fld>
             <a:endParaRPr lang="es-GT"/>
           </a:p>
@@ -2936,7 +2936,7 @@
           <a:p>
             <a:fld id="{C21E9A4D-486D-44AE-8B3F-36C139010308}" type="datetimeFigureOut">
               <a:rPr lang="es-GT" smtClean="0"/>
-              <a:t>24/03/2023</a:t>
+              <a:t>7/10/2023</a:t>
             </a:fld>
             <a:endParaRPr lang="es-GT"/>
           </a:p>
@@ -4939,7 +4939,7 @@
             </a:r>
             <a:r>
               <a:rPr lang="es-GT" dirty="0"/>
-              <a:t>: Entorno de trabajo</a:t>
+              <a:t>: Entorno de trabajo y levantar servicios</a:t>
             </a:r>
           </a:p>
           <a:p>
@@ -7190,13 +7190,8 @@
           <a:p>
             <a:r>
               <a:rPr lang="es-GT" sz="2000" dirty="0"/>
-              <a:t>Ejecutar instrucción por </a:t>
-            </a:r>
-            <a:r>
-              <a:rPr lang="es-GT" sz="2000" dirty="0" err="1"/>
-              <a:t>instruccion</a:t>
-            </a:r>
-            <a:endParaRPr lang="es-GT" sz="2000" dirty="0"/>
+              <a:t>Ejecutar instrucción por instrucción</a:t>
+            </a:r>
           </a:p>
           <a:p>
             <a:r>
@@ -7632,7 +7627,7 @@
               <a:t> -g </a:t>
             </a:r>
             <a:r>
-              <a:rPr lang="es-GT" sz="1800">
+              <a:rPr lang="es-GT" sz="1800" dirty="0" err="1">
                 <a:solidFill>
                   <a:schemeClr val="tx2"/>
                 </a:solidFill>

</xml_diff>